<commit_message>
images added for presentation
</commit_message>
<xml_diff>
--- a/presentations/Final Presentation.pptx
+++ b/presentations/Final Presentation.pptx
@@ -246,7 +246,7 @@
           <a:p>
             <a:fld id="{3DB548AD-334B-4731-B639-4ED2902D672E}" type="datetimeFigureOut">
               <a:rPr lang="de-DE" smtClean="0"/>
-              <a:t>22.02.2020</a:t>
+              <a:t>23.02.2020</a:t>
             </a:fld>
             <a:endParaRPr lang="de-DE"/>
           </a:p>
@@ -3919,6 +3919,13 @@
   <p:clrMapOvr>
     <a:masterClrMapping/>
   </p:clrMapOvr>
+  <p:timing>
+    <p:tnLst>
+      <p:par>
+        <p:cTn id="1" dur="indefinite" restart="never" nodeType="tmRoot"/>
+      </p:par>
+    </p:tnLst>
+  </p:timing>
 </p:sld>
 </file>
 
@@ -4182,6 +4189,13 @@
   <p:clrMapOvr>
     <a:masterClrMapping/>
   </p:clrMapOvr>
+  <p:timing>
+    <p:tnLst>
+      <p:par>
+        <p:cTn id="1" dur="indefinite" restart="never" nodeType="tmRoot"/>
+      </p:par>
+    </p:tnLst>
+  </p:timing>
 </p:sld>
 </file>
 
@@ -4737,6 +4751,13 @@
   <p:clrMapOvr>
     <a:masterClrMapping/>
   </p:clrMapOvr>
+  <p:timing>
+    <p:tnLst>
+      <p:par>
+        <p:cTn id="1" dur="indefinite" restart="never" nodeType="tmRoot"/>
+      </p:par>
+    </p:tnLst>
+  </p:timing>
 </p:sld>
 </file>
 
@@ -4883,6 +4904,13 @@
   <p:clrMapOvr>
     <a:masterClrMapping/>
   </p:clrMapOvr>
+  <p:timing>
+    <p:tnLst>
+      <p:par>
+        <p:cTn id="1" dur="indefinite" restart="never" nodeType="tmRoot"/>
+      </p:par>
+    </p:tnLst>
+  </p:timing>
 </p:sld>
 </file>
 
@@ -4990,12 +5018,6 @@
               </a:rPr>
               <a:t>Cost-Sensitive Boosting</a:t>
             </a:r>
-            <a:endParaRPr lang="en-US" dirty="0" smtClean="0">
-              <a:solidFill>
-                <a:srgbClr val="000000"/>
-              </a:solidFill>
-              <a:cs typeface="Arial"/>
-            </a:endParaRPr>
           </a:p>
           <a:p>
             <a:pPr lvl="1">
@@ -5085,6 +5107,13 @@
   <p:clrMapOvr>
     <a:masterClrMapping/>
   </p:clrMapOvr>
+  <p:timing>
+    <p:tnLst>
+      <p:par>
+        <p:cTn id="1" dur="indefinite" restart="never" nodeType="tmRoot"/>
+      </p:par>
+    </p:tnLst>
+  </p:timing>
 </p:sld>
 </file>
 
@@ -5241,7 +5270,6 @@
               <a:rPr lang="en-US" dirty="0" smtClean="0"/>
               <a:t>data</a:t>
             </a:r>
-            <a:endParaRPr lang="en-US" dirty="0" smtClean="0"/>
           </a:p>
           <a:p>
             <a:r>
@@ -5383,6 +5411,13 @@
   <p:clrMapOvr>
     <a:masterClrMapping/>
   </p:clrMapOvr>
+  <p:timing>
+    <p:tnLst>
+      <p:par>
+        <p:cTn id="1" dur="indefinite" restart="never" nodeType="tmRoot"/>
+      </p:par>
+    </p:tnLst>
+  </p:timing>
 </p:sld>
 </file>
 
@@ -5608,7 +5643,7 @@
         <p:spPr>
           <a:xfrm>
             <a:off x="6546467" y="5601915"/>
-            <a:ext cx="6096000" cy="276999"/>
+            <a:ext cx="6096000" cy="261610"/>
           </a:xfrm>
           <a:prstGeom prst="rect">
             <a:avLst/>
@@ -5621,12 +5656,9 @@
           <a:lstStyle/>
           <a:p>
             <a:r>
-              <a:rPr lang="en-US" sz="1200" dirty="0">
-                <a:hlinkClick r:id="rId4"/>
-              </a:rPr>
+              <a:rPr lang="en-US" sz="1100" dirty="0"/>
               <a:t>https://towardsdatascience.com/understanding-adaboost-2f94f22d5bfe</a:t>
             </a:r>
-            <a:endParaRPr lang="en-US" sz="1200" dirty="0"/>
           </a:p>
         </p:txBody>
       </p:sp>
@@ -5640,6 +5672,13 @@
   <p:clrMapOvr>
     <a:masterClrMapping/>
   </p:clrMapOvr>
+  <p:timing>
+    <p:tnLst>
+      <p:par>
+        <p:cTn id="1" dur="indefinite" restart="never" nodeType="tmRoot"/>
+      </p:par>
+    </p:tnLst>
+  </p:timing>
 </p:sld>
 </file>
 
@@ -5781,7 +5820,7 @@
       </p:sp>
       <p:pic>
         <p:nvPicPr>
-          <p:cNvPr id="6" name="Picture 5"/>
+          <p:cNvPr id="5" name="Picture 4"/>
           <p:cNvPicPr>
             <a:picLocks noChangeAspect="1"/>
           </p:cNvPicPr>
@@ -5795,14 +5834,274 @@
         </p:blipFill>
         <p:spPr>
           <a:xfrm>
-            <a:off x="3699164" y="2832770"/>
-            <a:ext cx="4714875" cy="3332503"/>
+            <a:off x="3988328" y="2727726"/>
+            <a:ext cx="4581525" cy="2924928"/>
           </a:xfrm>
           <a:prstGeom prst="rect">
             <a:avLst/>
           </a:prstGeom>
         </p:spPr>
       </p:pic>
+      <p:sp>
+        <p:nvSpPr>
+          <p:cNvPr id="8" name="Rectangle 7"/>
+          <p:cNvSpPr/>
+          <p:nvPr/>
+        </p:nvSpPr>
+        <p:spPr bwMode="auto">
+          <a:xfrm>
+            <a:off x="7259782" y="3909837"/>
+            <a:ext cx="193963" cy="191108"/>
+          </a:xfrm>
+          <a:prstGeom prst="rect">
+            <a:avLst/>
+          </a:prstGeom>
+          <a:noFill/>
+          <a:ln w="9525" cap="flat" cmpd="sng" algn="ctr">
+            <a:solidFill>
+              <a:srgbClr val="FF0000"/>
+            </a:solidFill>
+            <a:prstDash val="solid"/>
+            <a:round/>
+            <a:headEnd type="none" w="med" len="med"/>
+            <a:tailEnd type="none" w="med" len="med"/>
+          </a:ln>
+          <a:effectLst/>
+          <a:extLst/>
+        </p:spPr>
+        <p:txBody>
+          <a:bodyPr vert="horz" wrap="square" lIns="91440" tIns="45720" rIns="91440" bIns="45720" numCol="1" rtlCol="0" anchor="t" anchorCtr="0" compatLnSpc="1">
+            <a:prstTxWarp prst="textNoShape">
+              <a:avLst/>
+            </a:prstTxWarp>
+          </a:bodyPr>
+          <a:lstStyle/>
+          <a:p>
+            <a:pPr marL="0" marR="0" indent="0" algn="l" defTabSz="914400" rtl="0" eaLnBrk="0" fontAlgn="base" latinLnBrk="0" hangingPunct="0">
+              <a:lnSpc>
+                <a:spcPct val="100000"/>
+              </a:lnSpc>
+              <a:spcBef>
+                <a:spcPct val="0"/>
+              </a:spcBef>
+              <a:spcAft>
+                <a:spcPct val="0"/>
+              </a:spcAft>
+              <a:buClrTx/>
+              <a:buSzTx/>
+              <a:buFontTx/>
+              <a:buNone/>
+              <a:tabLst/>
+            </a:pPr>
+            <a:endParaRPr kumimoji="0" lang="en-US" sz="2400" b="0" i="0" u="none" strike="noStrike" cap="none" normalizeH="0" baseline="0" smtClean="0">
+              <a:ln>
+                <a:noFill/>
+              </a:ln>
+              <a:solidFill>
+                <a:schemeClr val="tx1"/>
+              </a:solidFill>
+              <a:effectLst/>
+              <a:latin typeface="Arial" charset="0"/>
+              <a:ea typeface="ＭＳ Ｐゴシック" pitchFamily="1" charset="-128"/>
+            </a:endParaRPr>
+          </a:p>
+        </p:txBody>
+      </p:sp>
+      <p:sp>
+        <p:nvSpPr>
+          <p:cNvPr id="9" name="Rectangle 8"/>
+          <p:cNvSpPr/>
+          <p:nvPr/>
+        </p:nvSpPr>
+        <p:spPr bwMode="auto">
+          <a:xfrm>
+            <a:off x="6650183" y="4519436"/>
+            <a:ext cx="193962" cy="213317"/>
+          </a:xfrm>
+          <a:prstGeom prst="rect">
+            <a:avLst/>
+          </a:prstGeom>
+          <a:noFill/>
+          <a:ln w="9525" cap="flat" cmpd="sng" algn="ctr">
+            <a:solidFill>
+              <a:srgbClr val="FF0000"/>
+            </a:solidFill>
+            <a:prstDash val="solid"/>
+            <a:round/>
+            <a:headEnd type="none" w="med" len="med"/>
+            <a:tailEnd type="none" w="med" len="med"/>
+          </a:ln>
+          <a:effectLst/>
+          <a:extLst/>
+        </p:spPr>
+        <p:txBody>
+          <a:bodyPr vert="horz" wrap="square" lIns="91440" tIns="45720" rIns="91440" bIns="45720" numCol="1" rtlCol="0" anchor="t" anchorCtr="0" compatLnSpc="1">
+            <a:prstTxWarp prst="textNoShape">
+              <a:avLst/>
+            </a:prstTxWarp>
+          </a:bodyPr>
+          <a:lstStyle/>
+          <a:p>
+            <a:pPr marL="0" marR="0" indent="0" algn="l" defTabSz="914400" rtl="0" eaLnBrk="0" fontAlgn="base" latinLnBrk="0" hangingPunct="0">
+              <a:lnSpc>
+                <a:spcPct val="100000"/>
+              </a:lnSpc>
+              <a:spcBef>
+                <a:spcPct val="0"/>
+              </a:spcBef>
+              <a:spcAft>
+                <a:spcPct val="0"/>
+              </a:spcAft>
+              <a:buClrTx/>
+              <a:buSzTx/>
+              <a:buFontTx/>
+              <a:buNone/>
+              <a:tabLst/>
+            </a:pPr>
+            <a:endParaRPr kumimoji="0" lang="en-US" sz="2400" b="0" i="0" u="none" strike="noStrike" cap="none" normalizeH="0" baseline="0" smtClean="0">
+              <a:ln>
+                <a:noFill/>
+              </a:ln>
+              <a:solidFill>
+                <a:schemeClr val="tx1"/>
+              </a:solidFill>
+              <a:effectLst/>
+              <a:latin typeface="Arial" charset="0"/>
+              <a:ea typeface="ＭＳ Ｐゴシック" pitchFamily="1" charset="-128"/>
+            </a:endParaRPr>
+          </a:p>
+        </p:txBody>
+      </p:sp>
+      <p:sp>
+        <p:nvSpPr>
+          <p:cNvPr id="12" name="Rectangle 11"/>
+          <p:cNvSpPr/>
+          <p:nvPr/>
+        </p:nvSpPr>
+        <p:spPr bwMode="auto">
+          <a:xfrm>
+            <a:off x="6650182" y="5154506"/>
+            <a:ext cx="193963" cy="191108"/>
+          </a:xfrm>
+          <a:prstGeom prst="rect">
+            <a:avLst/>
+          </a:prstGeom>
+          <a:noFill/>
+          <a:ln w="9525" cap="flat" cmpd="sng" algn="ctr">
+            <a:solidFill>
+              <a:srgbClr val="FF0000"/>
+            </a:solidFill>
+            <a:prstDash val="solid"/>
+            <a:round/>
+            <a:headEnd type="none" w="med" len="med"/>
+            <a:tailEnd type="none" w="med" len="med"/>
+          </a:ln>
+          <a:effectLst/>
+          <a:extLst/>
+        </p:spPr>
+        <p:txBody>
+          <a:bodyPr vert="horz" wrap="square" lIns="91440" tIns="45720" rIns="91440" bIns="45720" numCol="1" rtlCol="0" anchor="t" anchorCtr="0" compatLnSpc="1">
+            <a:prstTxWarp prst="textNoShape">
+              <a:avLst/>
+            </a:prstTxWarp>
+          </a:bodyPr>
+          <a:lstStyle/>
+          <a:p>
+            <a:pPr marL="0" marR="0" indent="0" algn="l" defTabSz="914400" rtl="0" eaLnBrk="0" fontAlgn="base" latinLnBrk="0" hangingPunct="0">
+              <a:lnSpc>
+                <a:spcPct val="100000"/>
+              </a:lnSpc>
+              <a:spcBef>
+                <a:spcPct val="0"/>
+              </a:spcBef>
+              <a:spcAft>
+                <a:spcPct val="0"/>
+              </a:spcAft>
+              <a:buClrTx/>
+              <a:buSzTx/>
+              <a:buFontTx/>
+              <a:buNone/>
+              <a:tabLst/>
+            </a:pPr>
+            <a:endParaRPr kumimoji="0" lang="en-US" sz="2400" b="0" i="0" u="none" strike="noStrike" cap="none" normalizeH="0" baseline="0" smtClean="0">
+              <a:ln>
+                <a:noFill/>
+              </a:ln>
+              <a:solidFill>
+                <a:schemeClr val="tx1"/>
+              </a:solidFill>
+              <a:effectLst/>
+              <a:latin typeface="Arial" charset="0"/>
+              <a:ea typeface="ＭＳ Ｐゴシック" pitchFamily="1" charset="-128"/>
+            </a:endParaRPr>
+          </a:p>
+        </p:txBody>
+      </p:sp>
+      <p:sp>
+        <p:nvSpPr>
+          <p:cNvPr id="13" name="Rectangle 12"/>
+          <p:cNvSpPr/>
+          <p:nvPr/>
+        </p:nvSpPr>
+        <p:spPr bwMode="auto">
+          <a:xfrm>
+            <a:off x="7416054" y="5154506"/>
+            <a:ext cx="193963" cy="191108"/>
+          </a:xfrm>
+          <a:prstGeom prst="rect">
+            <a:avLst/>
+          </a:prstGeom>
+          <a:noFill/>
+          <a:ln w="9525" cap="flat" cmpd="sng" algn="ctr">
+            <a:solidFill>
+              <a:srgbClr val="FF0000"/>
+            </a:solidFill>
+            <a:prstDash val="solid"/>
+            <a:round/>
+            <a:headEnd type="none" w="med" len="med"/>
+            <a:tailEnd type="none" w="med" len="med"/>
+          </a:ln>
+          <a:effectLst/>
+          <a:extLst/>
+        </p:spPr>
+        <p:txBody>
+          <a:bodyPr vert="horz" wrap="square" lIns="91440" tIns="45720" rIns="91440" bIns="45720" numCol="1" rtlCol="0" anchor="t" anchorCtr="0" compatLnSpc="1">
+            <a:prstTxWarp prst="textNoShape">
+              <a:avLst/>
+            </a:prstTxWarp>
+          </a:bodyPr>
+          <a:lstStyle/>
+          <a:p>
+            <a:pPr marL="0" marR="0" indent="0" algn="l" defTabSz="914400" rtl="0" eaLnBrk="0" fontAlgn="base" latinLnBrk="0" hangingPunct="0">
+              <a:lnSpc>
+                <a:spcPct val="100000"/>
+              </a:lnSpc>
+              <a:spcBef>
+                <a:spcPct val="0"/>
+              </a:spcBef>
+              <a:spcAft>
+                <a:spcPct val="0"/>
+              </a:spcAft>
+              <a:buClrTx/>
+              <a:buSzTx/>
+              <a:buFontTx/>
+              <a:buNone/>
+              <a:tabLst/>
+            </a:pPr>
+            <a:endParaRPr kumimoji="0" lang="en-US" sz="2400" b="0" i="0" u="none" strike="noStrike" cap="none" normalizeH="0" baseline="0" smtClean="0">
+              <a:ln>
+                <a:noFill/>
+              </a:ln>
+              <a:solidFill>
+                <a:schemeClr val="tx1"/>
+              </a:solidFill>
+              <a:effectLst/>
+              <a:latin typeface="Arial" charset="0"/>
+              <a:ea typeface="ＭＳ Ｐゴシック" pitchFamily="1" charset="-128"/>
+            </a:endParaRPr>
+          </a:p>
+        </p:txBody>
+      </p:sp>
     </p:spTree>
     <p:extLst>
       <p:ext uri="{BB962C8B-B14F-4D97-AF65-F5344CB8AC3E}">
@@ -5813,6 +6112,13 @@
   <p:clrMapOvr>
     <a:masterClrMapping/>
   </p:clrMapOvr>
+  <p:timing>
+    <p:tnLst>
+      <p:par>
+        <p:cTn id="1" dur="indefinite" restart="never" nodeType="tmRoot"/>
+      </p:par>
+    </p:tnLst>
+  </p:timing>
 </p:sld>
 </file>
 
@@ -6509,6 +6815,13 @@
   <p:clrMapOvr>
     <a:masterClrMapping/>
   </p:clrMapOvr>
+  <p:timing>
+    <p:tnLst>
+      <p:par>
+        <p:cTn id="1" dur="indefinite" restart="never" nodeType="tmRoot"/>
+      </p:par>
+    </p:tnLst>
+  </p:timing>
 </p:sld>
 </file>
 
@@ -6596,13 +6909,7 @@
               <a:rPr lang="en-US" dirty="0" smtClean="0">
                 <a:cs typeface="Arial"/>
               </a:rPr>
-              <a:t>Dealing with missing </a:t>
-            </a:r>
-            <a:r>
-              <a:rPr lang="en-US" dirty="0" smtClean="0">
-                <a:cs typeface="Arial"/>
-              </a:rPr>
-              <a:t>values</a:t>
+              <a:t>Dealing with missing values</a:t>
             </a:r>
           </a:p>
           <a:p>
@@ -6751,8 +7058,8 @@
         </p:nvSpPr>
         <p:spPr>
           <a:xfrm>
-            <a:off x="4548671" y="5371817"/>
-            <a:ext cx="5250874" cy="261610"/>
+            <a:off x="4994205" y="5368211"/>
+            <a:ext cx="4359803" cy="233627"/>
           </a:xfrm>
           <a:prstGeom prst="rect">
             <a:avLst/>
@@ -6766,9 +7073,14 @@
           <a:lstStyle/>
           <a:p>
             <a:r>
-              <a:rPr lang="en-US" sz="1100" dirty="0"/>
-              <a:t>https://cran.r-project.org/web/packages/tfdatasets/vignettes/feature_columns.html</a:t>
-            </a:r>
+              <a:rPr lang="en-US" sz="900" dirty="0"/>
+              <a:t>https://</a:t>
+            </a:r>
+            <a:r>
+              <a:rPr lang="en-US" sz="900" dirty="0" smtClean="0"/>
+              <a:t>cran.r-project.org/web/packages/tfdatasets/vignettes/feature_columns.html</a:t>
+            </a:r>
+            <a:endParaRPr lang="en-US" sz="900" dirty="0"/>
           </a:p>
         </p:txBody>
       </p:sp>
@@ -6802,65 +7114,162 @@
           </a:prstGeom>
         </p:spPr>
       </p:pic>
-      <p:sp>
-        <p:nvSpPr>
-          <p:cNvPr id="10" name="TextBox 9"/>
-          <p:cNvSpPr txBox="1"/>
-          <p:nvPr/>
-        </p:nvSpPr>
-        <p:spPr>
-          <a:xfrm>
-            <a:off x="5892995" y="2958165"/>
-            <a:ext cx="6068290" cy="430887"/>
-          </a:xfrm>
-          <a:prstGeom prst="rect">
-            <a:avLst/>
-          </a:prstGeom>
-          <a:noFill/>
-        </p:spPr>
-        <p:txBody>
-          <a:bodyPr wrap="square" rtlCol="0">
-            <a:spAutoFit/>
-          </a:bodyPr>
-          <a:lstStyle/>
-          <a:p>
-            <a:r>
-              <a:rPr lang="en-US" sz="1100" dirty="0"/>
-              <a:t>https://towardsdatascience.com/6-different-ways-to-compensate-for-missing-values-data-imputation-with-examples-6022d9ca0779</a:t>
-            </a:r>
-          </a:p>
-        </p:txBody>
-      </p:sp>
       <p:pic>
         <p:nvPicPr>
-          <p:cNvPr id="11" name="Picture 10"/>
+          <p:cNvPr id="5" name="Picture 4"/>
           <p:cNvPicPr>
             <a:picLocks noChangeAspect="1"/>
           </p:cNvPicPr>
           <p:nvPr/>
         </p:nvPicPr>
         <p:blipFill>
-          <a:blip r:embed="rId3">
-            <a:extLst>
-              <a:ext uri="{28A0092B-C50C-407E-A947-70E740481C1C}">
-                <a14:useLocalDpi xmlns:a14="http://schemas.microsoft.com/office/drawing/2010/main" val="0"/>
-              </a:ext>
-            </a:extLst>
-          </a:blip>
+          <a:blip r:embed="rId3"/>
           <a:stretch>
             <a:fillRect/>
           </a:stretch>
         </p:blipFill>
         <p:spPr>
           <a:xfrm>
-            <a:off x="5763491" y="1181234"/>
-            <a:ext cx="6123709" cy="1706896"/>
+            <a:off x="5767387" y="1343694"/>
+            <a:ext cx="2181225" cy="1362075"/>
           </a:xfrm>
           <a:prstGeom prst="rect">
             <a:avLst/>
           </a:prstGeom>
         </p:spPr>
       </p:pic>
+      <p:pic>
+        <p:nvPicPr>
+          <p:cNvPr id="6" name="Picture 5"/>
+          <p:cNvPicPr>
+            <a:picLocks noChangeAspect="1"/>
+          </p:cNvPicPr>
+          <p:nvPr/>
+        </p:nvPicPr>
+        <p:blipFill>
+          <a:blip r:embed="rId4"/>
+          <a:stretch>
+            <a:fillRect/>
+          </a:stretch>
+        </p:blipFill>
+        <p:spPr>
+          <a:xfrm>
+            <a:off x="9260082" y="1343694"/>
+            <a:ext cx="2257425" cy="1419225"/>
+          </a:xfrm>
+          <a:prstGeom prst="rect">
+            <a:avLst/>
+          </a:prstGeom>
+        </p:spPr>
+      </p:pic>
+      <p:sp>
+        <p:nvSpPr>
+          <p:cNvPr id="14" name="Right Arrow 13"/>
+          <p:cNvSpPr/>
+          <p:nvPr/>
+        </p:nvSpPr>
+        <p:spPr bwMode="auto">
+          <a:xfrm>
+            <a:off x="8140557" y="2061943"/>
+            <a:ext cx="927580" cy="217038"/>
+          </a:xfrm>
+          <a:prstGeom prst="rightArrow">
+            <a:avLst/>
+          </a:prstGeom>
+          <a:solidFill>
+            <a:schemeClr val="accent2">
+              <a:lumMod val="40000"/>
+              <a:lumOff val="60000"/>
+            </a:schemeClr>
+          </a:solidFill>
+          <a:ln w="9525" cap="flat" cmpd="sng" algn="ctr">
+            <a:solidFill>
+              <a:schemeClr val="bg1"/>
+            </a:solidFill>
+            <a:prstDash val="solid"/>
+            <a:round/>
+            <a:headEnd type="none" w="med" len="med"/>
+            <a:tailEnd type="none" w="med" len="med"/>
+          </a:ln>
+          <a:effectLst/>
+          <a:extLst/>
+        </p:spPr>
+        <p:txBody>
+          <a:bodyPr vert="horz" wrap="square" lIns="91440" tIns="45720" rIns="91440" bIns="45720" numCol="1" rtlCol="0" anchor="t" anchorCtr="0" compatLnSpc="1">
+            <a:prstTxWarp prst="textNoShape">
+              <a:avLst/>
+            </a:prstTxWarp>
+          </a:bodyPr>
+          <a:lstStyle/>
+          <a:p>
+            <a:pPr marL="0" marR="0" indent="0" algn="l" defTabSz="914400" rtl="0" eaLnBrk="0" fontAlgn="base" latinLnBrk="0" hangingPunct="0">
+              <a:lnSpc>
+                <a:spcPct val="100000"/>
+              </a:lnSpc>
+              <a:spcBef>
+                <a:spcPct val="0"/>
+              </a:spcBef>
+              <a:spcAft>
+                <a:spcPct val="0"/>
+              </a:spcAft>
+              <a:buClrTx/>
+              <a:buSzTx/>
+              <a:buFontTx/>
+              <a:buNone/>
+              <a:tabLst/>
+            </a:pPr>
+            <a:endParaRPr kumimoji="0" lang="en-US" sz="2400" b="0" i="0" u="none" strike="noStrike" cap="none" normalizeH="0" baseline="0" smtClean="0">
+              <a:ln>
+                <a:noFill/>
+              </a:ln>
+              <a:solidFill>
+                <a:schemeClr val="accent2"/>
+              </a:solidFill>
+              <a:effectLst/>
+              <a:latin typeface="Arial" charset="0"/>
+              <a:ea typeface="ＭＳ Ｐゴシック" pitchFamily="1" charset="-128"/>
+            </a:endParaRPr>
+          </a:p>
+        </p:txBody>
+      </p:sp>
+      <p:sp>
+        <p:nvSpPr>
+          <p:cNvPr id="15" name="TextBox 14"/>
+          <p:cNvSpPr txBox="1"/>
+          <p:nvPr/>
+        </p:nvSpPr>
+        <p:spPr>
+          <a:xfrm>
+            <a:off x="8271164" y="1773382"/>
+            <a:ext cx="796973" cy="276999"/>
+          </a:xfrm>
+          <a:prstGeom prst="rect">
+            <a:avLst/>
+          </a:prstGeom>
+          <a:noFill/>
+        </p:spPr>
+        <p:txBody>
+          <a:bodyPr wrap="square" rtlCol="0">
+            <a:spAutoFit/>
+          </a:bodyPr>
+          <a:lstStyle/>
+          <a:p>
+            <a:r>
+              <a:rPr lang="de-DE" sz="1200" b="1" dirty="0" err="1" smtClean="0">
+                <a:solidFill>
+                  <a:schemeClr val="accent6"/>
+                </a:solidFill>
+              </a:rPr>
+              <a:t>Impute</a:t>
+            </a:r>
+            <a:endParaRPr lang="en-US" sz="1200" b="1" dirty="0">
+              <a:solidFill>
+                <a:schemeClr val="accent6"/>
+              </a:solidFill>
+            </a:endParaRPr>
+          </a:p>
+        </p:txBody>
+      </p:sp>
     </p:spTree>
     <p:extLst>
       <p:ext uri="{BB962C8B-B14F-4D97-AF65-F5344CB8AC3E}">
@@ -6871,6 +7280,13 @@
   <p:clrMapOvr>
     <a:masterClrMapping/>
   </p:clrMapOvr>
+  <p:timing>
+    <p:tnLst>
+      <p:par>
+        <p:cTn id="1" dur="indefinite" restart="never" nodeType="tmRoot"/>
+      </p:par>
+    </p:tnLst>
+  </p:timing>
 </p:sld>
 </file>
 
@@ -6937,7 +7353,12 @@
             <p:ph idx="1"/>
           </p:nvPr>
         </p:nvSpPr>
-        <p:spPr/>
+        <p:spPr>
+          <a:xfrm>
+            <a:off x="723136" y="1861532"/>
+            <a:ext cx="11216217" cy="4659312"/>
+          </a:xfrm>
+        </p:spPr>
         <p:txBody>
           <a:bodyPr/>
           <a:lstStyle/>
@@ -7038,6 +7459,716 @@
           </a:p>
         </p:txBody>
       </p:sp>
+      <p:pic>
+        <p:nvPicPr>
+          <p:cNvPr id="5" name="Picture 4"/>
+          <p:cNvPicPr>
+            <a:picLocks noChangeAspect="1"/>
+          </p:cNvPicPr>
+          <p:nvPr/>
+        </p:nvPicPr>
+        <p:blipFill>
+          <a:blip r:embed="rId2"/>
+          <a:stretch>
+            <a:fillRect/>
+          </a:stretch>
+        </p:blipFill>
+        <p:spPr>
+          <a:xfrm>
+            <a:off x="6504284" y="2835563"/>
+            <a:ext cx="1775115" cy="1376466"/>
+          </a:xfrm>
+          <a:prstGeom prst="rect">
+            <a:avLst/>
+          </a:prstGeom>
+        </p:spPr>
+      </p:pic>
+      <p:pic>
+        <p:nvPicPr>
+          <p:cNvPr id="6" name="Picture 5"/>
+          <p:cNvPicPr>
+            <a:picLocks noChangeAspect="1"/>
+          </p:cNvPicPr>
+          <p:nvPr/>
+        </p:nvPicPr>
+        <p:blipFill>
+          <a:blip r:embed="rId3"/>
+          <a:stretch>
+            <a:fillRect/>
+          </a:stretch>
+        </p:blipFill>
+        <p:spPr>
+          <a:xfrm>
+            <a:off x="8671493" y="2433833"/>
+            <a:ext cx="1411806" cy="816695"/>
+          </a:xfrm>
+          <a:prstGeom prst="rect">
+            <a:avLst/>
+          </a:prstGeom>
+        </p:spPr>
+      </p:pic>
+      <p:pic>
+        <p:nvPicPr>
+          <p:cNvPr id="7" name="Picture 6"/>
+          <p:cNvPicPr>
+            <a:picLocks noChangeAspect="1"/>
+          </p:cNvPicPr>
+          <p:nvPr/>
+        </p:nvPicPr>
+        <p:blipFill>
+          <a:blip r:embed="rId4"/>
+          <a:stretch>
+            <a:fillRect/>
+          </a:stretch>
+        </p:blipFill>
+        <p:spPr>
+          <a:xfrm>
+            <a:off x="8733406" y="4067062"/>
+            <a:ext cx="1411806" cy="503506"/>
+          </a:xfrm>
+          <a:prstGeom prst="rect">
+            <a:avLst/>
+          </a:prstGeom>
+        </p:spPr>
+      </p:pic>
+      <p:cxnSp>
+        <p:nvCxnSpPr>
+          <p:cNvPr id="24" name="Straight Arrow Connector 23"/>
+          <p:cNvCxnSpPr/>
+          <p:nvPr/>
+        </p:nvCxnSpPr>
+        <p:spPr bwMode="auto">
+          <a:xfrm flipV="1">
+            <a:off x="8206394" y="3165348"/>
+            <a:ext cx="309846" cy="230605"/>
+          </a:xfrm>
+          <a:prstGeom prst="straightConnector1">
+            <a:avLst/>
+          </a:prstGeom>
+          <a:solidFill>
+            <a:schemeClr val="accent1"/>
+          </a:solidFill>
+          <a:ln w="9525" cap="flat" cmpd="sng" algn="ctr">
+            <a:solidFill>
+              <a:schemeClr val="tx1"/>
+            </a:solidFill>
+            <a:prstDash val="solid"/>
+            <a:round/>
+            <a:headEnd type="none" w="med" len="med"/>
+            <a:tailEnd type="triangle"/>
+          </a:ln>
+          <a:effectLst/>
+          <a:extLst>
+            <a:ext uri="{AF507438-7753-43E0-B8FC-AC1667EBCBE1}">
+              <a14:hiddenEffects xmlns:a14="http://schemas.microsoft.com/office/drawing/2010/main">
+                <a:effectLst>
+                  <a:outerShdw dist="35921" dir="2700000" algn="ctr" rotWithShape="0">
+                    <a:schemeClr val="bg2"/>
+                  </a:outerShdw>
+                </a:effectLst>
+              </a14:hiddenEffects>
+            </a:ext>
+          </a:extLst>
+        </p:spPr>
+      </p:cxnSp>
+      <p:cxnSp>
+        <p:nvCxnSpPr>
+          <p:cNvPr id="25" name="Straight Arrow Connector 24"/>
+          <p:cNvCxnSpPr/>
+          <p:nvPr/>
+        </p:nvCxnSpPr>
+        <p:spPr bwMode="auto">
+          <a:xfrm>
+            <a:off x="8206394" y="3988017"/>
+            <a:ext cx="434255" cy="79046"/>
+          </a:xfrm>
+          <a:prstGeom prst="straightConnector1">
+            <a:avLst/>
+          </a:prstGeom>
+          <a:solidFill>
+            <a:schemeClr val="accent1"/>
+          </a:solidFill>
+          <a:ln w="9525" cap="flat" cmpd="sng" algn="ctr">
+            <a:solidFill>
+              <a:schemeClr val="tx1"/>
+            </a:solidFill>
+            <a:prstDash val="solid"/>
+            <a:round/>
+            <a:headEnd type="none" w="med" len="med"/>
+            <a:tailEnd type="triangle"/>
+          </a:ln>
+          <a:effectLst/>
+          <a:extLst>
+            <a:ext uri="{AF507438-7753-43E0-B8FC-AC1667EBCBE1}">
+              <a14:hiddenEffects xmlns:a14="http://schemas.microsoft.com/office/drawing/2010/main">
+                <a:effectLst>
+                  <a:outerShdw dist="35921" dir="2700000" algn="ctr" rotWithShape="0">
+                    <a:schemeClr val="bg2"/>
+                  </a:outerShdw>
+                </a:effectLst>
+              </a14:hiddenEffects>
+            </a:ext>
+          </a:extLst>
+        </p:spPr>
+      </p:cxnSp>
+      <p:sp>
+        <p:nvSpPr>
+          <p:cNvPr id="26" name="Flowchart: Magnetic Disk 25"/>
+          <p:cNvSpPr/>
+          <p:nvPr/>
+        </p:nvSpPr>
+        <p:spPr bwMode="auto">
+          <a:xfrm>
+            <a:off x="4065462" y="3239686"/>
+            <a:ext cx="645083" cy="787616"/>
+          </a:xfrm>
+          <a:prstGeom prst="flowChartMagneticDisk">
+            <a:avLst/>
+          </a:prstGeom>
+          <a:solidFill>
+            <a:schemeClr val="bg1"/>
+          </a:solidFill>
+          <a:ln w="9525" cap="flat" cmpd="sng" algn="ctr">
+            <a:solidFill>
+              <a:schemeClr val="tx1"/>
+            </a:solidFill>
+            <a:prstDash val="solid"/>
+            <a:round/>
+            <a:headEnd type="none" w="med" len="med"/>
+            <a:tailEnd type="none" w="med" len="med"/>
+          </a:ln>
+          <a:effectLst/>
+          <a:extLst/>
+        </p:spPr>
+        <p:txBody>
+          <a:bodyPr vert="horz" wrap="square" lIns="91440" tIns="45720" rIns="91440" bIns="45720" numCol="1" rtlCol="0" anchor="t" anchorCtr="0" compatLnSpc="1">
+            <a:prstTxWarp prst="textNoShape">
+              <a:avLst/>
+            </a:prstTxWarp>
+          </a:bodyPr>
+          <a:lstStyle/>
+          <a:p>
+            <a:pPr marL="0" marR="0" indent="0" algn="l" defTabSz="914400" rtl="0" eaLnBrk="0" fontAlgn="base" latinLnBrk="0" hangingPunct="0">
+              <a:lnSpc>
+                <a:spcPct val="100000"/>
+              </a:lnSpc>
+              <a:spcBef>
+                <a:spcPct val="0"/>
+              </a:spcBef>
+              <a:spcAft>
+                <a:spcPct val="0"/>
+              </a:spcAft>
+              <a:buClrTx/>
+              <a:buSzTx/>
+              <a:buFontTx/>
+              <a:buNone/>
+              <a:tabLst/>
+            </a:pPr>
+            <a:endParaRPr kumimoji="0" lang="en-US" sz="1600" b="0" i="0" u="none" strike="noStrike" cap="none" normalizeH="0" baseline="0" dirty="0" smtClean="0">
+              <a:ln>
+                <a:noFill/>
+              </a:ln>
+              <a:solidFill>
+                <a:schemeClr val="tx1"/>
+              </a:solidFill>
+              <a:effectLst/>
+              <a:latin typeface="Arial" charset="0"/>
+              <a:ea typeface="ＭＳ Ｐゴシック" pitchFamily="1" charset="-128"/>
+            </a:endParaRPr>
+          </a:p>
+        </p:txBody>
+      </p:sp>
+      <p:sp>
+        <p:nvSpPr>
+          <p:cNvPr id="27" name="Flowchart: Decision 26"/>
+          <p:cNvSpPr/>
+          <p:nvPr/>
+        </p:nvSpPr>
+        <p:spPr bwMode="auto">
+          <a:xfrm>
+            <a:off x="5257961" y="3258642"/>
+            <a:ext cx="758709" cy="689220"/>
+          </a:xfrm>
+          <a:prstGeom prst="flowChartDecision">
+            <a:avLst/>
+          </a:prstGeom>
+          <a:solidFill>
+            <a:schemeClr val="bg1"/>
+          </a:solidFill>
+          <a:ln w="9525" cap="flat" cmpd="sng" algn="ctr">
+            <a:solidFill>
+              <a:schemeClr val="tx1"/>
+            </a:solidFill>
+            <a:prstDash val="solid"/>
+            <a:round/>
+            <a:headEnd type="none" w="med" len="med"/>
+            <a:tailEnd type="none" w="med" len="med"/>
+          </a:ln>
+          <a:effectLst/>
+          <a:extLst/>
+        </p:spPr>
+        <p:txBody>
+          <a:bodyPr vert="horz" wrap="square" lIns="91440" tIns="45720" rIns="91440" bIns="45720" numCol="1" rtlCol="0" anchor="t" anchorCtr="0" compatLnSpc="1">
+            <a:prstTxWarp prst="textNoShape">
+              <a:avLst/>
+            </a:prstTxWarp>
+          </a:bodyPr>
+          <a:lstStyle/>
+          <a:p>
+            <a:pPr marL="0" marR="0" indent="0" algn="l" defTabSz="914400" rtl="0" eaLnBrk="0" fontAlgn="base" latinLnBrk="0" hangingPunct="0">
+              <a:lnSpc>
+                <a:spcPct val="100000"/>
+              </a:lnSpc>
+              <a:spcBef>
+                <a:spcPct val="0"/>
+              </a:spcBef>
+              <a:spcAft>
+                <a:spcPct val="0"/>
+              </a:spcAft>
+              <a:buClrTx/>
+              <a:buSzTx/>
+              <a:buFontTx/>
+              <a:buNone/>
+              <a:tabLst/>
+            </a:pPr>
+            <a:endParaRPr kumimoji="0" lang="en-US" sz="2400" b="0" i="0" u="none" strike="noStrike" cap="none" normalizeH="0" baseline="0" dirty="0" smtClean="0">
+              <a:ln>
+                <a:noFill/>
+              </a:ln>
+              <a:solidFill>
+                <a:schemeClr val="tx1"/>
+              </a:solidFill>
+              <a:effectLst/>
+              <a:latin typeface="Arial" charset="0"/>
+              <a:ea typeface="ＭＳ Ｐゴシック" pitchFamily="1" charset="-128"/>
+            </a:endParaRPr>
+          </a:p>
+        </p:txBody>
+      </p:sp>
+      <p:sp>
+        <p:nvSpPr>
+          <p:cNvPr id="28" name="Rounded Rectangle 27"/>
+          <p:cNvSpPr/>
+          <p:nvPr/>
+        </p:nvSpPr>
+        <p:spPr bwMode="auto">
+          <a:xfrm>
+            <a:off x="10640291" y="2313709"/>
+            <a:ext cx="858983" cy="374073"/>
+          </a:xfrm>
+          <a:prstGeom prst="roundRect">
+            <a:avLst/>
+          </a:prstGeom>
+          <a:solidFill>
+            <a:schemeClr val="bg1"/>
+          </a:solidFill>
+          <a:ln w="9525" cap="flat" cmpd="sng" algn="ctr">
+            <a:solidFill>
+              <a:schemeClr val="tx1"/>
+            </a:solidFill>
+            <a:prstDash val="solid"/>
+            <a:round/>
+            <a:headEnd type="none" w="med" len="med"/>
+            <a:tailEnd type="none" w="med" len="med"/>
+          </a:ln>
+          <a:effectLst/>
+          <a:extLst/>
+        </p:spPr>
+        <p:txBody>
+          <a:bodyPr vert="horz" wrap="square" lIns="91440" tIns="45720" rIns="91440" bIns="45720" numCol="1" rtlCol="0" anchor="t" anchorCtr="0" compatLnSpc="1">
+            <a:prstTxWarp prst="textNoShape">
+              <a:avLst/>
+            </a:prstTxWarp>
+          </a:bodyPr>
+          <a:lstStyle/>
+          <a:p>
+            <a:pPr marL="0" marR="0" indent="0" algn="l" defTabSz="914400" rtl="0" eaLnBrk="0" fontAlgn="base" latinLnBrk="0" hangingPunct="0">
+              <a:lnSpc>
+                <a:spcPct val="100000"/>
+              </a:lnSpc>
+              <a:spcBef>
+                <a:spcPct val="0"/>
+              </a:spcBef>
+              <a:spcAft>
+                <a:spcPct val="0"/>
+              </a:spcAft>
+              <a:buClrTx/>
+              <a:buSzTx/>
+              <a:buFontTx/>
+              <a:buNone/>
+              <a:tabLst/>
+            </a:pPr>
+            <a:r>
+              <a:rPr kumimoji="0" lang="en-US" b="0" i="0" u="none" strike="noStrike" cap="none" normalizeH="0" baseline="0" dirty="0" smtClean="0">
+                <a:ln>
+                  <a:noFill/>
+                </a:ln>
+                <a:solidFill>
+                  <a:schemeClr val="tx1"/>
+                </a:solidFill>
+                <a:effectLst/>
+                <a:latin typeface="Arial" charset="0"/>
+                <a:ea typeface="ＭＳ Ｐゴシック" pitchFamily="1" charset="-128"/>
+              </a:rPr>
+              <a:t>Model</a:t>
+            </a:r>
+            <a:endParaRPr kumimoji="0" lang="en-US" b="0" i="0" u="none" strike="noStrike" cap="none" normalizeH="0" baseline="0" dirty="0" smtClean="0">
+              <a:ln>
+                <a:noFill/>
+              </a:ln>
+              <a:solidFill>
+                <a:schemeClr val="tx1"/>
+              </a:solidFill>
+              <a:effectLst/>
+              <a:latin typeface="Arial" charset="0"/>
+              <a:ea typeface="ＭＳ Ｐゴシック" pitchFamily="1" charset="-128"/>
+            </a:endParaRPr>
+          </a:p>
+        </p:txBody>
+      </p:sp>
+      <p:sp>
+        <p:nvSpPr>
+          <p:cNvPr id="31" name="Rounded Rectangle 30"/>
+          <p:cNvSpPr/>
+          <p:nvPr/>
+        </p:nvSpPr>
+        <p:spPr bwMode="auto">
+          <a:xfrm>
+            <a:off x="10805139" y="4191188"/>
+            <a:ext cx="1122218" cy="374073"/>
+          </a:xfrm>
+          <a:prstGeom prst="roundRect">
+            <a:avLst/>
+          </a:prstGeom>
+          <a:solidFill>
+            <a:schemeClr val="bg1"/>
+          </a:solidFill>
+          <a:ln w="9525" cap="flat" cmpd="sng" algn="ctr">
+            <a:solidFill>
+              <a:schemeClr val="tx1"/>
+            </a:solidFill>
+            <a:prstDash val="solid"/>
+            <a:round/>
+            <a:headEnd type="none" w="med" len="med"/>
+            <a:tailEnd type="none" w="med" len="med"/>
+          </a:ln>
+          <a:effectLst/>
+          <a:extLst/>
+        </p:spPr>
+        <p:txBody>
+          <a:bodyPr vert="horz" wrap="square" lIns="91440" tIns="45720" rIns="91440" bIns="45720" numCol="1" rtlCol="0" anchor="t" anchorCtr="0" compatLnSpc="1">
+            <a:prstTxWarp prst="textNoShape">
+              <a:avLst/>
+            </a:prstTxWarp>
+          </a:bodyPr>
+          <a:lstStyle/>
+          <a:p>
+            <a:pPr marL="0" marR="0" indent="0" algn="l" defTabSz="914400" rtl="0" eaLnBrk="0" fontAlgn="base" latinLnBrk="0" hangingPunct="0">
+              <a:lnSpc>
+                <a:spcPct val="100000"/>
+              </a:lnSpc>
+              <a:spcBef>
+                <a:spcPct val="0"/>
+              </a:spcBef>
+              <a:spcAft>
+                <a:spcPct val="0"/>
+              </a:spcAft>
+              <a:buClrTx/>
+              <a:buSzTx/>
+              <a:buFontTx/>
+              <a:buNone/>
+              <a:tabLst/>
+            </a:pPr>
+            <a:r>
+              <a:rPr kumimoji="0" lang="en-US" b="0" i="0" u="none" strike="noStrike" cap="none" normalizeH="0" baseline="0" dirty="0" smtClean="0">
+                <a:ln>
+                  <a:noFill/>
+                </a:ln>
+                <a:solidFill>
+                  <a:schemeClr val="tx1"/>
+                </a:solidFill>
+                <a:effectLst/>
+                <a:latin typeface="Arial" charset="0"/>
+                <a:ea typeface="ＭＳ Ｐゴシック" pitchFamily="1" charset="-128"/>
+              </a:rPr>
+              <a:t>Evaluate</a:t>
+            </a:r>
+            <a:endParaRPr kumimoji="0" lang="en-US" b="0" i="0" u="none" strike="noStrike" cap="none" normalizeH="0" baseline="0" dirty="0" smtClean="0">
+              <a:ln>
+                <a:noFill/>
+              </a:ln>
+              <a:solidFill>
+                <a:schemeClr val="tx1"/>
+              </a:solidFill>
+              <a:effectLst/>
+              <a:latin typeface="Arial" charset="0"/>
+              <a:ea typeface="ＭＳ Ｐゴシック" pitchFamily="1" charset="-128"/>
+            </a:endParaRPr>
+          </a:p>
+        </p:txBody>
+      </p:sp>
+      <p:cxnSp>
+        <p:nvCxnSpPr>
+          <p:cNvPr id="36" name="Straight Arrow Connector 35"/>
+          <p:cNvCxnSpPr/>
+          <p:nvPr/>
+        </p:nvCxnSpPr>
+        <p:spPr bwMode="auto">
+          <a:xfrm>
+            <a:off x="6158207" y="3604322"/>
+            <a:ext cx="346077" cy="0"/>
+          </a:xfrm>
+          <a:prstGeom prst="straightConnector1">
+            <a:avLst/>
+          </a:prstGeom>
+          <a:solidFill>
+            <a:schemeClr val="accent1"/>
+          </a:solidFill>
+          <a:ln w="9525" cap="flat" cmpd="sng" algn="ctr">
+            <a:solidFill>
+              <a:schemeClr val="tx1"/>
+            </a:solidFill>
+            <a:prstDash val="solid"/>
+            <a:round/>
+            <a:headEnd type="none" w="med" len="med"/>
+            <a:tailEnd type="triangle"/>
+          </a:ln>
+          <a:effectLst/>
+          <a:extLst>
+            <a:ext uri="{AF507438-7753-43E0-B8FC-AC1667EBCBE1}">
+              <a14:hiddenEffects xmlns:a14="http://schemas.microsoft.com/office/drawing/2010/main">
+                <a:effectLst>
+                  <a:outerShdw dist="35921" dir="2700000" algn="ctr" rotWithShape="0">
+                    <a:schemeClr val="bg2"/>
+                  </a:outerShdw>
+                </a:effectLst>
+              </a14:hiddenEffects>
+            </a:ext>
+          </a:extLst>
+        </p:spPr>
+      </p:cxnSp>
+      <p:cxnSp>
+        <p:nvCxnSpPr>
+          <p:cNvPr id="39" name="Straight Arrow Connector 38"/>
+          <p:cNvCxnSpPr/>
+          <p:nvPr/>
+        </p:nvCxnSpPr>
+        <p:spPr bwMode="auto">
+          <a:xfrm>
+            <a:off x="4813300" y="3603252"/>
+            <a:ext cx="346077" cy="0"/>
+          </a:xfrm>
+          <a:prstGeom prst="straightConnector1">
+            <a:avLst/>
+          </a:prstGeom>
+          <a:solidFill>
+            <a:schemeClr val="accent1"/>
+          </a:solidFill>
+          <a:ln w="9525" cap="flat" cmpd="sng" algn="ctr">
+            <a:solidFill>
+              <a:schemeClr val="tx1"/>
+            </a:solidFill>
+            <a:prstDash val="solid"/>
+            <a:round/>
+            <a:headEnd type="none" w="med" len="med"/>
+            <a:tailEnd type="triangle"/>
+          </a:ln>
+          <a:effectLst/>
+          <a:extLst>
+            <a:ext uri="{AF507438-7753-43E0-B8FC-AC1667EBCBE1}">
+              <a14:hiddenEffects xmlns:a14="http://schemas.microsoft.com/office/drawing/2010/main">
+                <a:effectLst>
+                  <a:outerShdw dist="35921" dir="2700000" algn="ctr" rotWithShape="0">
+                    <a:schemeClr val="bg2"/>
+                  </a:outerShdw>
+                </a:effectLst>
+              </a14:hiddenEffects>
+            </a:ext>
+          </a:extLst>
+        </p:spPr>
+      </p:cxnSp>
+      <p:cxnSp>
+        <p:nvCxnSpPr>
+          <p:cNvPr id="41" name="Curved Connector 40"/>
+          <p:cNvCxnSpPr/>
+          <p:nvPr/>
+        </p:nvCxnSpPr>
+        <p:spPr bwMode="auto">
+          <a:xfrm rot="5400000" flipH="1" flipV="1">
+            <a:off x="10159676" y="2827894"/>
+            <a:ext cx="477566" cy="360218"/>
+          </a:xfrm>
+          <a:prstGeom prst="curvedConnector3">
+            <a:avLst>
+              <a:gd name="adj1" fmla="val 47099"/>
+            </a:avLst>
+          </a:prstGeom>
+          <a:solidFill>
+            <a:schemeClr val="accent1"/>
+          </a:solidFill>
+          <a:ln w="9525" cap="flat" cmpd="sng" algn="ctr">
+            <a:solidFill>
+              <a:schemeClr val="tx1"/>
+            </a:solidFill>
+            <a:prstDash val="solid"/>
+            <a:round/>
+            <a:headEnd type="none" w="med" len="med"/>
+            <a:tailEnd type="triangle"/>
+          </a:ln>
+          <a:effectLst/>
+          <a:extLst>
+            <a:ext uri="{AF507438-7753-43E0-B8FC-AC1667EBCBE1}">
+              <a14:hiddenEffects xmlns:a14="http://schemas.microsoft.com/office/drawing/2010/main">
+                <a:effectLst>
+                  <a:outerShdw dist="35921" dir="2700000" algn="ctr" rotWithShape="0">
+                    <a:schemeClr val="bg2"/>
+                  </a:outerShdw>
+                </a:effectLst>
+              </a14:hiddenEffects>
+            </a:ext>
+          </a:extLst>
+        </p:spPr>
+      </p:cxnSp>
+      <p:cxnSp>
+        <p:nvCxnSpPr>
+          <p:cNvPr id="43" name="Curved Connector 42"/>
+          <p:cNvCxnSpPr/>
+          <p:nvPr/>
+        </p:nvCxnSpPr>
+        <p:spPr bwMode="auto">
+          <a:xfrm rot="5400000" flipH="1" flipV="1">
+            <a:off x="9929286" y="3151450"/>
+            <a:ext cx="1185121" cy="566585"/>
+          </a:xfrm>
+          <a:prstGeom prst="curvedConnector3">
+            <a:avLst/>
+          </a:prstGeom>
+          <a:solidFill>
+            <a:schemeClr val="accent1"/>
+          </a:solidFill>
+          <a:ln w="9525" cap="flat" cmpd="sng" algn="ctr">
+            <a:solidFill>
+              <a:schemeClr val="tx1"/>
+            </a:solidFill>
+            <a:prstDash val="solid"/>
+            <a:round/>
+            <a:headEnd type="none" w="med" len="med"/>
+            <a:tailEnd type="triangle"/>
+          </a:ln>
+          <a:effectLst/>
+          <a:extLst>
+            <a:ext uri="{AF507438-7753-43E0-B8FC-AC1667EBCBE1}">
+              <a14:hiddenEffects xmlns:a14="http://schemas.microsoft.com/office/drawing/2010/main">
+                <a:effectLst>
+                  <a:outerShdw dist="35921" dir="2700000" algn="ctr" rotWithShape="0">
+                    <a:schemeClr val="bg2"/>
+                  </a:outerShdw>
+                </a:effectLst>
+              </a14:hiddenEffects>
+            </a:ext>
+          </a:extLst>
+        </p:spPr>
+      </p:cxnSp>
+      <p:cxnSp>
+        <p:nvCxnSpPr>
+          <p:cNvPr id="46" name="Straight Arrow Connector 45"/>
+          <p:cNvCxnSpPr/>
+          <p:nvPr/>
+        </p:nvCxnSpPr>
+        <p:spPr bwMode="auto">
+          <a:xfrm>
+            <a:off x="11326092" y="2813286"/>
+            <a:ext cx="173182" cy="1181660"/>
+          </a:xfrm>
+          <a:prstGeom prst="straightConnector1">
+            <a:avLst/>
+          </a:prstGeom>
+          <a:solidFill>
+            <a:schemeClr val="accent1"/>
+          </a:solidFill>
+          <a:ln w="9525" cap="flat" cmpd="sng" algn="ctr">
+            <a:solidFill>
+              <a:schemeClr val="tx1"/>
+            </a:solidFill>
+            <a:prstDash val="solid"/>
+            <a:round/>
+            <a:headEnd type="none" w="med" len="med"/>
+            <a:tailEnd type="triangle"/>
+          </a:ln>
+          <a:effectLst/>
+          <a:extLst>
+            <a:ext uri="{AF507438-7753-43E0-B8FC-AC1667EBCBE1}">
+              <a14:hiddenEffects xmlns:a14="http://schemas.microsoft.com/office/drawing/2010/main">
+                <a:effectLst>
+                  <a:outerShdw dist="35921" dir="2700000" algn="ctr" rotWithShape="0">
+                    <a:schemeClr val="bg2"/>
+                  </a:outerShdw>
+                </a:effectLst>
+              </a14:hiddenEffects>
+            </a:ext>
+          </a:extLst>
+        </p:spPr>
+      </p:cxnSp>
+      <p:sp>
+        <p:nvSpPr>
+          <p:cNvPr id="51" name="TextBox 50"/>
+          <p:cNvSpPr txBox="1"/>
+          <p:nvPr/>
+        </p:nvSpPr>
+        <p:spPr>
+          <a:xfrm>
+            <a:off x="5133552" y="3994946"/>
+            <a:ext cx="1009482" cy="374073"/>
+          </a:xfrm>
+          <a:prstGeom prst="rect">
+            <a:avLst/>
+          </a:prstGeom>
+          <a:noFill/>
+        </p:spPr>
+        <p:txBody>
+          <a:bodyPr wrap="square" rtlCol="0">
+            <a:spAutoFit/>
+          </a:bodyPr>
+          <a:lstStyle/>
+          <a:p>
+            <a:r>
+              <a:rPr lang="en-US" dirty="0"/>
+              <a:t>prepare</a:t>
+            </a:r>
+            <a:endParaRPr lang="en-US" dirty="0"/>
+          </a:p>
+        </p:txBody>
+      </p:sp>
+      <p:sp>
+        <p:nvSpPr>
+          <p:cNvPr id="53" name="TextBox 52"/>
+          <p:cNvSpPr txBox="1"/>
+          <p:nvPr/>
+        </p:nvSpPr>
+        <p:spPr>
+          <a:xfrm>
+            <a:off x="4065462" y="4067062"/>
+            <a:ext cx="799282" cy="369332"/>
+          </a:xfrm>
+          <a:prstGeom prst="rect">
+            <a:avLst/>
+          </a:prstGeom>
+          <a:noFill/>
+        </p:spPr>
+        <p:txBody>
+          <a:bodyPr wrap="square" rtlCol="0">
+            <a:spAutoFit/>
+          </a:bodyPr>
+          <a:lstStyle/>
+          <a:p>
+            <a:r>
+              <a:rPr lang="en-US" dirty="0" smtClean="0"/>
+              <a:t>Data</a:t>
+            </a:r>
+            <a:endParaRPr lang="en-US" dirty="0"/>
+          </a:p>
+        </p:txBody>
+      </p:sp>
     </p:spTree>
     <p:extLst>
       <p:ext uri="{BB962C8B-B14F-4D97-AF65-F5344CB8AC3E}">
@@ -7048,6 +8179,13 @@
   <p:clrMapOvr>
     <a:masterClrMapping/>
   </p:clrMapOvr>
+  <p:timing>
+    <p:tnLst>
+      <p:par>
+        <p:cTn id="1" dur="indefinite" restart="never" nodeType="tmRoot"/>
+      </p:par>
+    </p:tnLst>
+  </p:timing>
 </p:sld>
 </file>
 
@@ -7287,6 +8425,13 @@
   <p:clrMapOvr>
     <a:masterClrMapping/>
   </p:clrMapOvr>
+  <p:timing>
+    <p:tnLst>
+      <p:par>
+        <p:cTn id="1" dur="indefinite" restart="never" nodeType="tmRoot"/>
+      </p:par>
+    </p:tnLst>
+  </p:timing>
 </p:sld>
 </file>
 

</xml_diff>